<commit_message>
다형성 interface upload ppt
</commit_message>
<xml_diff>
--- a/ppt/day08_클래스이해.pptx
+++ b/ppt/day08_클래스이해.pptx
@@ -306,7 +306,7 @@
           <a:p>
             <a:fld id="{59F50280-B240-479C-B2B8-4548BCFE84D4}" type="datetimeFigureOut">
               <a:rPr lang="ko-KR" altLang="en-US" smtClean="0"/>
-              <a:t>2018-01-07</a:t>
+              <a:t>2018-01-21</a:t>
             </a:fld>
             <a:endParaRPr lang="ko-KR" altLang="en-US"/>
           </a:p>
@@ -471,7 +471,7 @@
           <a:p>
             <a:fld id="{59F50280-B240-479C-B2B8-4548BCFE84D4}" type="datetimeFigureOut">
               <a:rPr lang="ko-KR" altLang="en-US" smtClean="0"/>
-              <a:t>2018-01-07</a:t>
+              <a:t>2018-01-21</a:t>
             </a:fld>
             <a:endParaRPr lang="ko-KR" altLang="en-US"/>
           </a:p>
@@ -646,7 +646,7 @@
           <a:p>
             <a:fld id="{59F50280-B240-479C-B2B8-4548BCFE84D4}" type="datetimeFigureOut">
               <a:rPr lang="ko-KR" altLang="en-US" smtClean="0"/>
-              <a:t>2018-01-07</a:t>
+              <a:t>2018-01-21</a:t>
             </a:fld>
             <a:endParaRPr lang="ko-KR" altLang="en-US"/>
           </a:p>
@@ -811,7 +811,7 @@
           <a:p>
             <a:fld id="{59F50280-B240-479C-B2B8-4548BCFE84D4}" type="datetimeFigureOut">
               <a:rPr lang="ko-KR" altLang="en-US" smtClean="0"/>
-              <a:t>2018-01-07</a:t>
+              <a:t>2018-01-21</a:t>
             </a:fld>
             <a:endParaRPr lang="ko-KR" altLang="en-US"/>
           </a:p>
@@ -1052,7 +1052,7 @@
           <a:p>
             <a:fld id="{59F50280-B240-479C-B2B8-4548BCFE84D4}" type="datetimeFigureOut">
               <a:rPr lang="ko-KR" altLang="en-US" smtClean="0"/>
-              <a:t>2018-01-07</a:t>
+              <a:t>2018-01-21</a:t>
             </a:fld>
             <a:endParaRPr lang="ko-KR" altLang="en-US"/>
           </a:p>
@@ -1335,7 +1335,7 @@
           <a:p>
             <a:fld id="{59F50280-B240-479C-B2B8-4548BCFE84D4}" type="datetimeFigureOut">
               <a:rPr lang="ko-KR" altLang="en-US" smtClean="0"/>
-              <a:t>2018-01-07</a:t>
+              <a:t>2018-01-21</a:t>
             </a:fld>
             <a:endParaRPr lang="ko-KR" altLang="en-US"/>
           </a:p>
@@ -1752,7 +1752,7 @@
           <a:p>
             <a:fld id="{59F50280-B240-479C-B2B8-4548BCFE84D4}" type="datetimeFigureOut">
               <a:rPr lang="ko-KR" altLang="en-US" smtClean="0"/>
-              <a:t>2018-01-07</a:t>
+              <a:t>2018-01-21</a:t>
             </a:fld>
             <a:endParaRPr lang="ko-KR" altLang="en-US"/>
           </a:p>
@@ -1865,7 +1865,7 @@
           <a:p>
             <a:fld id="{59F50280-B240-479C-B2B8-4548BCFE84D4}" type="datetimeFigureOut">
               <a:rPr lang="ko-KR" altLang="en-US" smtClean="0"/>
-              <a:t>2018-01-07</a:t>
+              <a:t>2018-01-21</a:t>
             </a:fld>
             <a:endParaRPr lang="ko-KR" altLang="en-US"/>
           </a:p>
@@ -1955,7 +1955,7 @@
           <a:p>
             <a:fld id="{59F50280-B240-479C-B2B8-4548BCFE84D4}" type="datetimeFigureOut">
               <a:rPr lang="ko-KR" altLang="en-US" smtClean="0"/>
-              <a:t>2018-01-07</a:t>
+              <a:t>2018-01-21</a:t>
             </a:fld>
             <a:endParaRPr lang="ko-KR" altLang="en-US"/>
           </a:p>
@@ -2227,7 +2227,7 @@
           <a:p>
             <a:fld id="{59F50280-B240-479C-B2B8-4548BCFE84D4}" type="datetimeFigureOut">
               <a:rPr lang="ko-KR" altLang="en-US" smtClean="0"/>
-              <a:t>2018-01-07</a:t>
+              <a:t>2018-01-21</a:t>
             </a:fld>
             <a:endParaRPr lang="ko-KR" altLang="en-US"/>
           </a:p>
@@ -2475,7 +2475,7 @@
           <a:p>
             <a:fld id="{59F50280-B240-479C-B2B8-4548BCFE84D4}" type="datetimeFigureOut">
               <a:rPr lang="ko-KR" altLang="en-US" smtClean="0"/>
-              <a:t>2018-01-07</a:t>
+              <a:t>2018-01-21</a:t>
             </a:fld>
             <a:endParaRPr lang="ko-KR" altLang="en-US"/>
           </a:p>
@@ -2683,7 +2683,7 @@
           <a:p>
             <a:fld id="{59F50280-B240-479C-B2B8-4548BCFE84D4}" type="datetimeFigureOut">
               <a:rPr lang="ko-KR" altLang="en-US" smtClean="0"/>
-              <a:t>2018-01-07</a:t>
+              <a:t>2018-01-21</a:t>
             </a:fld>
             <a:endParaRPr lang="ko-KR" altLang="en-US"/>
           </a:p>
@@ -15715,15 +15715,7 @@
                             <a:schemeClr val="tx1"/>
                           </a:solidFill>
                         </a:rPr>
-                        <a:t>FishBread</a:t>
-                      </a:r>
-                      <a:r>
-                        <a:rPr lang="en-US" altLang="ko-KR" b="0" dirty="0" err="1" smtClean="0">
-                          <a:solidFill>
-                            <a:schemeClr val="tx1"/>
-                          </a:solidFill>
-                        </a:rPr>
-                        <a:t>CEO</a:t>
+                        <a:t>FishBreadCEO</a:t>
                       </a:r>
                       <a:endParaRPr lang="ko-KR" altLang="en-US" b="0" dirty="0">
                         <a:solidFill>
@@ -17452,15 +17444,7 @@
                             <a:schemeClr val="tx1"/>
                           </a:solidFill>
                         </a:rPr>
-                        <a:t>FishBread</a:t>
-                      </a:r>
-                      <a:r>
-                        <a:rPr lang="en-US" altLang="ko-KR" b="0" dirty="0" err="1" smtClean="0">
-                          <a:solidFill>
-                            <a:schemeClr val="tx1"/>
-                          </a:solidFill>
-                        </a:rPr>
-                        <a:t>CEO</a:t>
+                        <a:t>FishBreadCEO</a:t>
                       </a:r>
                       <a:endParaRPr lang="ko-KR" altLang="en-US" b="0" dirty="0">
                         <a:solidFill>

</xml_diff>